<commit_message>
Added samples of Master-and-Layout-slides,Paragraphs,Find-and-Replace,Lists,Images
</commit_message>
<xml_diff>
--- a/PowerPoint-Presentation/Access-built-in-document-properties/.NET/Access-built-in-document-properties/Data/Template.pptx
+++ b/PowerPoint-Presentation/Access-built-in-document-properties/.NET/Access-built-in-document-properties/Data/Template.pptx
@@ -285,7 +285,7 @@
           <a:p>
             <a:fld id="{8669AFDC-7658-4951-B0FF-52DFF2A93C0A}" type="datetimeFigureOut">
               <a:rPr lang="en-US" dirty="0"/>
-              <a:t>12/28/2022</a:t>
+              <a:t>12/29/2022</a:t>
             </a:fld>
             <a:endParaRPr lang="en-US" dirty="0"/>
           </a:p>
@@ -469,7 +469,7 @@
           <a:p>
             <a:fld id="{3ABD2D7A-D230-4F91-BD59-0A39C2703BA8}" type="datetimeFigureOut">
               <a:rPr lang="en-US" dirty="0"/>
-              <a:t>12/28/2022</a:t>
+              <a:t>12/29/2022</a:t>
             </a:fld>
             <a:endParaRPr lang="en-US" dirty="0"/>
           </a:p>
@@ -886,7 +886,7 @@
           <a:p>
             <a:fld id="{B61BEF0D-F0BB-DE4B-95CE-6DB70DBA9567}" type="datetimeFigureOut">
               <a:rPr lang="en-US" dirty="0"/>
-              <a:t>12/28/2022</a:t>
+              <a:t>12/29/2022</a:t>
             </a:fld>
             <a:endParaRPr lang="en-US" dirty="0"/>
           </a:p>
@@ -1073,7 +1073,7 @@
           <a:p>
             <a:fld id="{03F41C87-7AD9-4845-A077-840E4A0F3F06}" type="datetimeFigureOut">
               <a:rPr lang="en-US" dirty="0"/>
-              <a:t>12/28/2022</a:t>
+              <a:t>12/29/2022</a:t>
             </a:fld>
             <a:endParaRPr lang="en-US" dirty="0"/>
           </a:p>
@@ -1268,7 +1268,7 @@
           <a:p>
             <a:fld id="{03F41C87-7AD9-4845-A077-840E4A0F3F06}" type="datetimeFigureOut">
               <a:rPr lang="en-US" dirty="0"/>
-              <a:t>12/28/2022</a:t>
+              <a:t>12/29/2022</a:t>
             </a:fld>
             <a:endParaRPr lang="en-US" dirty="0"/>
           </a:p>
@@ -1455,7 +1455,7 @@
           <a:p>
             <a:fld id="{03F41C87-7AD9-4845-A077-840E4A0F3F06}" type="datetimeFigureOut">
               <a:rPr lang="en-US" dirty="0"/>
-              <a:t>12/28/2022</a:t>
+              <a:t>12/29/2022</a:t>
             </a:fld>
             <a:endParaRPr lang="en-US" dirty="0"/>
           </a:p>
@@ -1717,7 +1717,7 @@
           <a:p>
             <a:fld id="{03F41C87-7AD9-4845-A077-840E4A0F3F06}" type="datetimeFigureOut">
               <a:rPr lang="en-US" dirty="0"/>
-              <a:t>12/28/2022</a:t>
+              <a:t>12/29/2022</a:t>
             </a:fld>
             <a:endParaRPr lang="en-US" dirty="0"/>
           </a:p>
@@ -1967,7 +1967,7 @@
           <a:p>
             <a:fld id="{03F41C87-7AD9-4845-A077-840E4A0F3F06}" type="datetimeFigureOut">
               <a:rPr lang="en-US" dirty="0"/>
-              <a:t>12/28/2022</a:t>
+              <a:t>12/29/2022</a:t>
             </a:fld>
             <a:endParaRPr lang="en-US" dirty="0"/>
           </a:p>
@@ -2357,7 +2357,7 @@
           <a:p>
             <a:fld id="{03F41C87-7AD9-4845-A077-840E4A0F3F06}" type="datetimeFigureOut">
               <a:rPr lang="en-US" dirty="0"/>
-              <a:t>12/28/2022</a:t>
+              <a:t>12/29/2022</a:t>
             </a:fld>
             <a:endParaRPr lang="en-US" dirty="0"/>
           </a:p>
@@ -2489,7 +2489,7 @@
           <a:p>
             <a:fld id="{03F41C87-7AD9-4845-A077-840E4A0F3F06}" type="datetimeFigureOut">
               <a:rPr lang="en-US" dirty="0"/>
-              <a:t>12/28/2022</a:t>
+              <a:t>12/29/2022</a:t>
             </a:fld>
             <a:endParaRPr lang="en-US" dirty="0"/>
           </a:p>
@@ -2594,7 +2594,7 @@
           <a:p>
             <a:fld id="{03F41C87-7AD9-4845-A077-840E4A0F3F06}" type="datetimeFigureOut">
               <a:rPr lang="en-US" dirty="0"/>
-              <a:t>12/28/2022</a:t>
+              <a:t>12/29/2022</a:t>
             </a:fld>
             <a:endParaRPr lang="en-US" dirty="0"/>
           </a:p>
@@ -2889,7 +2889,7 @@
           <a:p>
             <a:fld id="{03F41C87-7AD9-4845-A077-840E4A0F3F06}" type="datetimeFigureOut">
               <a:rPr lang="en-US" dirty="0"/>
-              <a:t>12/28/2022</a:t>
+              <a:t>12/29/2022</a:t>
             </a:fld>
             <a:endParaRPr lang="en-US" dirty="0"/>
           </a:p>
@@ -3162,7 +3162,7 @@
           <a:p>
             <a:fld id="{B61BEF0D-F0BB-DE4B-95CE-6DB70DBA9567}" type="datetimeFigureOut">
               <a:rPr lang="en-US" dirty="0"/>
-              <a:t>12/28/2022</a:t>
+              <a:t>12/29/2022</a:t>
             </a:fld>
             <a:endParaRPr lang="en-US" dirty="0"/>
           </a:p>
@@ -3392,7 +3392,7 @@
           <a:p>
             <a:fld id="{03F41C87-7AD9-4845-A077-840E4A0F3F06}" type="datetimeFigureOut">
               <a:rPr lang="en-US" dirty="0"/>
-              <a:t>12/28/2022</a:t>
+              <a:t>12/29/2022</a:t>
             </a:fld>
             <a:endParaRPr lang="en-US" dirty="0"/>
           </a:p>
@@ -3826,20 +3826,14 @@
           </a:bodyPr>
           <a:lstStyle/>
           <a:p>
-            <a:pPr defTabSz="914126"/>
-            <a:endParaRPr lang="en-US" sz="4000" dirty="0">
-              <a:latin typeface="+mn-lt"/>
-            </a:endParaRPr>
-          </a:p>
-          <a:p>
             <a:pPr algn="ctr" defTabSz="914126"/>
             <a:r>
-              <a:rPr sz="4000" b="1" cap="all" dirty="0">
+              <a:rPr lang="en-US" sz="4000" b="1" dirty="0">
                 <a:latin typeface="+mn-lt"/>
                 <a:ea typeface="Adobe Garamond Pro"/>
                 <a:cs typeface="Adobe Garamond Pro"/>
               </a:rPr>
-              <a:t>Essential Presentation</a:t>
+              <a:t>Adventure Works Cycles</a:t>
             </a:r>
           </a:p>
         </p:txBody>
@@ -3856,8 +3850,8 @@
         </p:nvSpPr>
         <p:spPr bwMode="white">
           <a:xfrm>
-            <a:off x="1216152" y="2441448"/>
-            <a:ext cx="9144000" cy="2816352"/>
+            <a:off x="1522412" y="2209800"/>
+            <a:ext cx="9144000" cy="3048000"/>
           </a:xfrm>
           <a:ln>
             <a:headEnd type="none"/>
@@ -3866,31 +3860,31 @@
         </p:spPr>
         <p:txBody>
           <a:bodyPr wrap="square" anchor="t">
-            <a:noAutofit/>
+            <a:normAutofit/>
           </a:bodyPr>
           <a:lstStyle/>
           <a:p>
-            <a:pPr defTabSz="914126"/>
-            <a:endParaRPr lang="en-US" sz="2100" dirty="0"/>
-          </a:p>
-          <a:p>
             <a:pPr algn="l" defTabSz="914126"/>
-            <a:r>
-              <a:rPr sz="2100" dirty="0">
+            <a:endParaRPr lang="en-US" dirty="0"/>
+          </a:p>
+          <a:p>
+            <a:pPr algn="l" defTabSz="914126"/>
+            <a:r>
+              <a:rPr lang="en-US" sz="2100" dirty="0">
                 <a:ea typeface="Adobe Garamond Pro"/>
                 <a:cs typeface="Adobe Garamond Pro"/>
               </a:rPr>
-              <a:t>Lorem ipsum dolor sit amet, lacus amet amet ultricies. Quisque mi venenatis morbi libero, orci dis, mi ut et class porta, massa ligula magna enim, aliquam orci vestibulum tempus.Turpis facilisis vitae consequat, cum a a, turpis dui consequat massa in dolor per, felis non amet.</a:t>
+              <a:t>Adventure Works Cycles, the fictitious company on which the Adventure Works sample databases are based, is a large, multinational manufacturing company. The company manufactures and sells metal and composite bicycles to North American, European and Asian commercial markets. </a:t>
             </a:r>
           </a:p>
           <a:p>
             <a:pPr algn="l" defTabSz="914126"/>
             <a:r>
-              <a:rPr sz="2100" dirty="0">
+              <a:rPr lang="en-US" sz="2100" dirty="0">
                 <a:ea typeface="Adobe Garamond Pro"/>
                 <a:cs typeface="Adobe Garamond Pro"/>
               </a:rPr>
-              <a:t>Turpis facilisis vitae consequat, cum a a, turpis dui consequat massa in dolor per, felis non amet. Auctor eleifend in omnis elit vestibulum, donec non elementum tellus est mauris, id aliquam, at lacus, arcu pretium proin lacus dolor et. Eu tortor, vel ultrices amet dignissim mauris vehicula.</a:t>
+              <a:t>In 2000, Adventure Works Cycles bought a small manufacturing plant, Importadores Neptuno, located in Mexico. Importadores Neptuno manufactures several critical subcomponents for the Adventure Works Cycles product line. These subcomponents are shipped to the Bothell location for final product assembly. </a:t>
             </a:r>
           </a:p>
         </p:txBody>

</xml_diff>